<commit_message>
minor corrections following major update
</commit_message>
<xml_diff>
--- a/book_chapters_LaTeX_original/images/chapterDependence.pptx
+++ b/book_chapters_LaTeX_original/images/chapterDependence.pptx
@@ -3047,7 +3047,7 @@
         </p:nvSpPr>
         <p:spPr>
           <a:xfrm>
-            <a:off x="6577232" y="524105"/>
+            <a:off x="6485792" y="524105"/>
             <a:ext cx="5064370" cy="4005298"/>
           </a:xfrm>
           <a:prstGeom prst="cloud">
@@ -3079,13 +3079,18 @@
           <a:p>
             <a:pPr algn="ctr"/>
             <a:r>
-              <a:rPr lang="en-US" sz="2400" b="1" dirty="0">
+              <a:rPr lang="en-US" sz="2400" b="1" dirty="0" smtClean="0">
                 <a:solidFill>
                   <a:srgbClr val="FF0000"/>
                 </a:solidFill>
               </a:rPr>
               <a:t>Examples</a:t>
             </a:r>
+            <a:endParaRPr lang="en-US" sz="2400" b="1" dirty="0">
+              <a:solidFill>
+                <a:srgbClr val="FF0000"/>
+              </a:solidFill>
+            </a:endParaRPr>
           </a:p>
         </p:txBody>
       </p:sp>
@@ -3159,7 +3164,7 @@
         </p:nvSpPr>
         <p:spPr>
           <a:xfrm>
-            <a:off x="7021732" y="4504284"/>
+            <a:off x="6899812" y="4504284"/>
             <a:ext cx="5064370" cy="4005299"/>
           </a:xfrm>
           <a:prstGeom prst="cloud">
@@ -3542,7 +3547,7 @@
         </p:nvSpPr>
         <p:spPr>
           <a:xfrm>
-            <a:off x="9089648" y="2562707"/>
+            <a:off x="9089648" y="2669387"/>
             <a:ext cx="1691169" cy="400110"/>
           </a:xfrm>
           <a:prstGeom prst="rect">
@@ -3786,7 +3791,7 @@
         </p:nvSpPr>
         <p:spPr>
           <a:xfrm>
-            <a:off x="8767139" y="5594033"/>
+            <a:off x="8767139" y="5502593"/>
             <a:ext cx="3142399" cy="400110"/>
           </a:xfrm>
           <a:prstGeom prst="rect">
@@ -3806,23 +3811,7 @@
                   <a:srgbClr val="00B050"/>
                 </a:solidFill>
               </a:rPr>
-              <a:t>15. </a:t>
-            </a:r>
-            <a:r>
-              <a:rPr lang="en-US" sz="2000" dirty="0" err="1">
-                <a:solidFill>
-                  <a:srgbClr val="00B050"/>
-                </a:solidFill>
-              </a:rPr>
-              <a:t>Cosets</a:t>
-            </a:r>
-            <a:r>
-              <a:rPr lang="en-US" sz="2000" dirty="0">
-                <a:solidFill>
-                  <a:srgbClr val="00B050"/>
-                </a:solidFill>
-              </a:rPr>
-              <a:t> and factor groups</a:t>
+              <a:t>15. Cosets and factor groups</a:t>
             </a:r>
           </a:p>
         </p:txBody>
@@ -3880,7 +3869,7 @@
         </p:nvSpPr>
         <p:spPr>
           <a:xfrm>
-            <a:off x="8058524" y="6474233"/>
+            <a:off x="8058524" y="6504713"/>
             <a:ext cx="3069495" cy="400110"/>
           </a:xfrm>
           <a:prstGeom prst="rect">
@@ -4041,7 +4030,7 @@
         <p:spPr>
           <a:xfrm>
             <a:off x="5361829" y="2105593"/>
-            <a:ext cx="3727819" cy="657169"/>
+            <a:ext cx="3727819" cy="763849"/>
           </a:xfrm>
           <a:prstGeom prst="straightConnector1">
             <a:avLst/>
@@ -4153,48 +4142,6 @@
       </p:cxnSp>
       <p:cxnSp>
         <p:nvCxnSpPr>
-          <p:cNvPr id="42" name="Straight Arrow Connector 41">
-            <a:extLst>
-              <a:ext uri="{FF2B5EF4-FFF2-40B4-BE49-F238E27FC236}">
-                <a16:creationId xmlns:a16="http://schemas.microsoft.com/office/drawing/2014/main" id="{D440EF5F-07A3-4EC7-A317-327D9C3B5B03}"/>
-              </a:ext>
-            </a:extLst>
-          </p:cNvPr>
-          <p:cNvCxnSpPr>
-            <a:cxnSpLocks/>
-            <a:stCxn id="12" idx="2"/>
-          </p:cNvCxnSpPr>
-          <p:nvPr/>
-        </p:nvCxnSpPr>
-        <p:spPr>
-          <a:xfrm flipH="1">
-            <a:off x="4550670" y="1715698"/>
-            <a:ext cx="45804" cy="327639"/>
-          </a:xfrm>
-          <a:prstGeom prst="straightConnector1">
-            <a:avLst/>
-          </a:prstGeom>
-          <a:ln>
-            <a:tailEnd type="arrow" w="lg" len="lg"/>
-          </a:ln>
-        </p:spPr>
-        <p:style>
-          <a:lnRef idx="1">
-            <a:schemeClr val="accent1"/>
-          </a:lnRef>
-          <a:fillRef idx="0">
-            <a:schemeClr val="accent1"/>
-          </a:fillRef>
-          <a:effectRef idx="0">
-            <a:schemeClr val="accent1"/>
-          </a:effectRef>
-          <a:fontRef idx="minor">
-            <a:schemeClr val="tx1"/>
-          </a:fontRef>
-        </p:style>
-      </p:cxnSp>
-      <p:cxnSp>
-        <p:nvCxnSpPr>
           <p:cNvPr id="46" name="Straight Arrow Connector 45">
             <a:extLst>
               <a:ext uri="{FF2B5EF4-FFF2-40B4-BE49-F238E27FC236}">
@@ -4212,7 +4159,7 @@
         <p:spPr>
           <a:xfrm>
             <a:off x="5361829" y="2105593"/>
-            <a:ext cx="2696695" cy="4568695"/>
+            <a:ext cx="2696695" cy="4599175"/>
           </a:xfrm>
           <a:prstGeom prst="straightConnector1">
             <a:avLst/>
@@ -4339,9 +4286,9 @@
           <p:nvPr/>
         </p:nvCxnSpPr>
         <p:spPr>
-          <a:xfrm flipV="1">
-            <a:off x="4917644" y="2762762"/>
-            <a:ext cx="4172004" cy="99083"/>
+          <a:xfrm>
+            <a:off x="4917644" y="2861845"/>
+            <a:ext cx="4172004" cy="7597"/>
           </a:xfrm>
           <a:prstGeom prst="straightConnector1">
             <a:avLst/>
@@ -4382,8 +4329,8 @@
         </p:nvCxnSpPr>
         <p:spPr>
           <a:xfrm>
-            <a:off x="3912393" y="3781622"/>
-            <a:ext cx="4854746" cy="2012466"/>
+            <a:off x="3416296" y="3765405"/>
+            <a:ext cx="5350843" cy="1937243"/>
           </a:xfrm>
           <a:prstGeom prst="straightConnector1">
             <a:avLst/>
@@ -4470,8 +4417,8 @@
         </p:nvCxnSpPr>
         <p:spPr>
           <a:xfrm flipH="1">
-            <a:off x="9503859" y="2942716"/>
-            <a:ext cx="628548" cy="4499407"/>
+            <a:off x="9503859" y="2991054"/>
+            <a:ext cx="782518" cy="4451069"/>
           </a:xfrm>
           <a:prstGeom prst="straightConnector1">
             <a:avLst/>
@@ -4783,14 +4730,12 @@
           </p:cNvPr>
           <p:cNvCxnSpPr>
             <a:cxnSpLocks/>
-            <a:stCxn id="9" idx="2"/>
-            <a:endCxn id="26" idx="0"/>
           </p:cNvCxnSpPr>
           <p:nvPr/>
         </p:nvCxnSpPr>
         <p:spPr>
           <a:xfrm>
-            <a:off x="8370508" y="1577982"/>
+            <a:off x="8370766" y="1617942"/>
             <a:ext cx="1133351" cy="5864141"/>
           </a:xfrm>
           <a:prstGeom prst="straightConnector1">
@@ -4829,14 +4774,13 @@
           </p:cNvPr>
           <p:cNvCxnSpPr>
             <a:cxnSpLocks/>
-            <a:endCxn id="25" idx="0"/>
           </p:cNvCxnSpPr>
           <p:nvPr/>
         </p:nvCxnSpPr>
         <p:spPr>
           <a:xfrm flipH="1">
-            <a:off x="8916480" y="5899964"/>
-            <a:ext cx="343048" cy="1088238"/>
+            <a:off x="8976596" y="5788676"/>
+            <a:ext cx="31558" cy="1362456"/>
           </a:xfrm>
           <a:prstGeom prst="straightConnector1">
             <a:avLst/>
@@ -4878,9 +4822,9 @@
           <p:nvPr/>
         </p:nvCxnSpPr>
         <p:spPr>
-          <a:xfrm>
-            <a:off x="9696773" y="6891200"/>
-            <a:ext cx="23399" cy="241327"/>
+          <a:xfrm flipH="1">
+            <a:off x="8588069" y="6795192"/>
+            <a:ext cx="10563" cy="365760"/>
           </a:xfrm>
           <a:prstGeom prst="straightConnector1">
             <a:avLst/>
@@ -5013,8 +4957,8 @@
         </p:nvCxnSpPr>
         <p:spPr>
           <a:xfrm flipH="1">
-            <a:off x="4631477" y="5351821"/>
-            <a:ext cx="3760818" cy="1490934"/>
+            <a:off x="4358548" y="5351821"/>
+            <a:ext cx="4033747" cy="1636381"/>
           </a:xfrm>
           <a:prstGeom prst="straightConnector1">
             <a:avLst/>
@@ -5058,8 +5002,8 @@
         </p:nvCxnSpPr>
         <p:spPr>
           <a:xfrm flipH="1">
-            <a:off x="5141597" y="5794088"/>
-            <a:ext cx="3625542" cy="1577367"/>
+            <a:off x="5057849" y="5702648"/>
+            <a:ext cx="3709290" cy="1913126"/>
           </a:xfrm>
           <a:prstGeom prst="straightConnector1">
             <a:avLst/>
@@ -5102,8 +5046,8 @@
         </p:nvCxnSpPr>
         <p:spPr>
           <a:xfrm flipH="1">
-            <a:off x="3617675" y="5409603"/>
-            <a:ext cx="4693299" cy="2650436"/>
+            <a:off x="3434128" y="5409603"/>
+            <a:ext cx="4876847" cy="2744995"/>
           </a:xfrm>
           <a:prstGeom prst="straightConnector1">
             <a:avLst/>
@@ -5195,6 +5139,138 @@
           <a:ln>
             <a:solidFill>
               <a:srgbClr val="FF0000"/>
+            </a:solidFill>
+            <a:tailEnd type="arrow" w="lg" len="lg"/>
+          </a:ln>
+        </p:spPr>
+        <p:style>
+          <a:lnRef idx="1">
+            <a:schemeClr val="accent1"/>
+          </a:lnRef>
+          <a:fillRef idx="0">
+            <a:schemeClr val="accent1"/>
+          </a:fillRef>
+          <a:effectRef idx="0">
+            <a:schemeClr val="accent1"/>
+          </a:effectRef>
+          <a:fontRef idx="minor">
+            <a:schemeClr val="tx1"/>
+          </a:fontRef>
+        </p:style>
+      </p:cxnSp>
+      <p:cxnSp>
+        <p:nvCxnSpPr>
+          <p:cNvPr id="56" name="Straight Arrow Connector 55">
+            <a:extLst>
+              <a:ext uri="{FF2B5EF4-FFF2-40B4-BE49-F238E27FC236}">
+                <a16:creationId xmlns:a16="http://schemas.microsoft.com/office/drawing/2014/main" id="{23C94104-6648-4939-8652-586D37C57804}"/>
+              </a:ext>
+            </a:extLst>
+          </p:cNvPr>
+          <p:cNvCxnSpPr>
+            <a:cxnSpLocks/>
+          </p:cNvCxnSpPr>
+          <p:nvPr/>
+        </p:nvCxnSpPr>
+        <p:spPr>
+          <a:xfrm flipH="1">
+            <a:off x="3660404" y="5409603"/>
+            <a:ext cx="4650572" cy="2241291"/>
+          </a:xfrm>
+          <a:prstGeom prst="straightConnector1">
+            <a:avLst/>
+          </a:prstGeom>
+          <a:ln>
+            <a:solidFill>
+              <a:srgbClr val="00B050"/>
+            </a:solidFill>
+            <a:tailEnd type="arrow" w="lg" len="lg"/>
+          </a:ln>
+        </p:spPr>
+        <p:style>
+          <a:lnRef idx="1">
+            <a:schemeClr val="accent1"/>
+          </a:lnRef>
+          <a:fillRef idx="0">
+            <a:schemeClr val="accent1"/>
+          </a:fillRef>
+          <a:effectRef idx="0">
+            <a:schemeClr val="accent1"/>
+          </a:effectRef>
+          <a:fontRef idx="minor">
+            <a:schemeClr val="tx1"/>
+          </a:fontRef>
+        </p:style>
+      </p:cxnSp>
+      <p:cxnSp>
+        <p:nvCxnSpPr>
+          <p:cNvPr id="62" name="Straight Arrow Connector 61">
+            <a:extLst>
+              <a:ext uri="{FF2B5EF4-FFF2-40B4-BE49-F238E27FC236}">
+                <a16:creationId xmlns:a16="http://schemas.microsoft.com/office/drawing/2014/main" id="{C4934EFF-27F3-4189-A337-3CC85EEF94C3}"/>
+              </a:ext>
+            </a:extLst>
+          </p:cNvPr>
+          <p:cNvCxnSpPr>
+            <a:cxnSpLocks/>
+          </p:cNvCxnSpPr>
+          <p:nvPr/>
+        </p:nvCxnSpPr>
+        <p:spPr>
+          <a:xfrm flipH="1">
+            <a:off x="8999549" y="5332152"/>
+            <a:ext cx="10563" cy="365760"/>
+          </a:xfrm>
+          <a:prstGeom prst="straightConnector1">
+            <a:avLst/>
+          </a:prstGeom>
+          <a:ln>
+            <a:solidFill>
+              <a:srgbClr val="00B050"/>
+            </a:solidFill>
+            <a:tailEnd type="arrow" w="lg" len="lg"/>
+          </a:ln>
+        </p:spPr>
+        <p:style>
+          <a:lnRef idx="1">
+            <a:schemeClr val="accent1"/>
+          </a:lnRef>
+          <a:fillRef idx="0">
+            <a:schemeClr val="accent1"/>
+          </a:fillRef>
+          <a:effectRef idx="0">
+            <a:schemeClr val="accent1"/>
+          </a:effectRef>
+          <a:fontRef idx="minor">
+            <a:schemeClr val="tx1"/>
+          </a:fontRef>
+        </p:style>
+      </p:cxnSp>
+      <p:cxnSp>
+        <p:nvCxnSpPr>
+          <p:cNvPr id="73" name="Straight Arrow Connector 72">
+            <a:extLst>
+              <a:ext uri="{FF2B5EF4-FFF2-40B4-BE49-F238E27FC236}">
+                <a16:creationId xmlns:a16="http://schemas.microsoft.com/office/drawing/2014/main" id="{C4934EFF-27F3-4189-A337-3CC85EEF94C3}"/>
+              </a:ext>
+            </a:extLst>
+          </p:cNvPr>
+          <p:cNvCxnSpPr>
+            <a:cxnSpLocks/>
+          </p:cNvCxnSpPr>
+          <p:nvPr/>
+        </p:nvCxnSpPr>
+        <p:spPr>
+          <a:xfrm flipH="1">
+            <a:off x="4640909" y="1659312"/>
+            <a:ext cx="10563" cy="365760"/>
+          </a:xfrm>
+          <a:prstGeom prst="straightConnector1">
+            <a:avLst/>
+          </a:prstGeom>
+          <a:ln>
+            <a:solidFill>
+              <a:schemeClr val="accent1"/>
             </a:solidFill>
             <a:tailEnd type="arrow" w="lg" len="lg"/>
           </a:ln>
@@ -5224,6 +5300,13 @@
   <p:clrMapOvr>
     <a:masterClrMapping/>
   </p:clrMapOvr>
+  <p:timing>
+    <p:tnLst>
+      <p:par>
+        <p:cTn id="1" dur="indefinite" restart="never" nodeType="tmRoot"/>
+      </p:par>
+    </p:tnLst>
+  </p:timing>
 </p:sld>
 </file>
 

</xml_diff>